<commit_message>
Cordova / App Store support
</commit_message>
<xml_diff>
--- a/media/process.pptx
+++ b/media/process.pptx
@@ -5,9 +5,9 @@
     <p:sldMasterId id="2147483648" r:id="rId1"/>
   </p:sldMasterIdLst>
   <p:sldIdLst>
-    <p:sldId id="257" r:id="rId2"/>
+    <p:sldId id="256" r:id="rId2"/>
   </p:sldIdLst>
-  <p:sldSz cx="9144000" cy="6858000" type="screen4x3"/>
+  <p:sldSz cx="5832475" cy="2663825"/>
   <p:notesSz cx="6858000" cy="9144000"/>
   <p:defaultTextStyle>
     <a:defPPr>
@@ -1102,27 +1102,27 @@
   </dgm:ptLst>
   <dgm:cxnLst>
     <dgm:cxn modelId="{54F6DCAE-619D-42BE-B359-6891D91846B4}" srcId="{0EB6BE91-E96C-4587-B286-5EF2C7262826}" destId="{EEC9F6EC-8789-4FD2-AFDB-B5D63A1CC8D1}" srcOrd="3" destOrd="0" parTransId="{79854CB4-F935-4D6E-B728-486399EE6BDB}" sibTransId="{20B5F3EB-8661-4D60-93D7-73B5B19D977C}"/>
-    <dgm:cxn modelId="{82F19BD7-B0D4-436A-8087-19B6D5208089}" type="presOf" srcId="{0EB6BE91-E96C-4587-B286-5EF2C7262826}" destId="{40F79579-AB6F-4F17-958C-F0D3416B4228}" srcOrd="0" destOrd="0" presId="urn:microsoft.com/office/officeart/2005/8/layout/chevron1"/>
-    <dgm:cxn modelId="{581E5E19-74DD-4BD4-9E91-C936A92B7D07}" srcId="{0EB6BE91-E96C-4587-B286-5EF2C7262826}" destId="{A5B2C75E-273A-4404-BE80-6201C68C9EDB}" srcOrd="2" destOrd="0" parTransId="{9C1B37AE-8899-425A-9733-080D2E6FF2E6}" sibTransId="{0478BD90-2D3C-4CB6-B8EC-15F6D84F2E91}"/>
-    <dgm:cxn modelId="{F2CC6D7F-C025-45A8-981E-382320AC1A48}" type="presOf" srcId="{09F6A35B-5D5C-4AEE-B2DF-B5B910646C5D}" destId="{1A0BED00-428A-4143-A6E6-7058B43EE6E3}" srcOrd="0" destOrd="0" presId="urn:microsoft.com/office/officeart/2005/8/layout/chevron1"/>
+    <dgm:cxn modelId="{0EBE4204-F5CD-4033-AC2D-B60BB29C3F50}" type="presOf" srcId="{A5B2C75E-273A-4404-BE80-6201C68C9EDB}" destId="{01FCF690-3A52-4BF2-9135-B54D20ED08E1}" srcOrd="0" destOrd="0" presId="urn:microsoft.com/office/officeart/2005/8/layout/chevron1"/>
+    <dgm:cxn modelId="{645C62F6-B80A-4127-A667-DA7D6EC0C84A}" type="presOf" srcId="{EEC9F6EC-8789-4FD2-AFDB-B5D63A1CC8D1}" destId="{4B65C82B-1FAF-4964-93C3-3E28BC03D6B9}" srcOrd="0" destOrd="0" presId="urn:microsoft.com/office/officeart/2005/8/layout/chevron1"/>
     <dgm:cxn modelId="{C978F6E0-33DC-4BF5-B0FA-738B3B674938}" srcId="{0EB6BE91-E96C-4587-B286-5EF2C7262826}" destId="{FF8ADAA4-FAFF-4095-AF09-16995FC20993}" srcOrd="0" destOrd="0" parTransId="{1A273BF8-4C09-4D0B-AA7C-98C7B5C24182}" sibTransId="{ABBA3832-E26D-4EE6-861B-1A3D690B764A}"/>
     <dgm:cxn modelId="{7A5B3EA0-554E-4790-8F68-8B6183D8A9D1}" srcId="{0EB6BE91-E96C-4587-B286-5EF2C7262826}" destId="{09F6A35B-5D5C-4AEE-B2DF-B5B910646C5D}" srcOrd="1" destOrd="0" parTransId="{A4135FA8-EB46-4822-9E73-F70DD89BD922}" sibTransId="{A9D07AFB-BB37-435B-A8DC-79DB8CBDEAC4}"/>
-    <dgm:cxn modelId="{0CB9751A-7E5D-4DD4-9342-202D86721772}" type="presOf" srcId="{FF8ADAA4-FAFF-4095-AF09-16995FC20993}" destId="{2B535912-FFB7-4908-8C3B-3E30209641D3}" srcOrd="0" destOrd="0" presId="urn:microsoft.com/office/officeart/2005/8/layout/chevron1"/>
-    <dgm:cxn modelId="{25AC0802-ACB4-44FE-A4B2-4459BCE9592D}" type="presOf" srcId="{EEC9F6EC-8789-4FD2-AFDB-B5D63A1CC8D1}" destId="{4B65C82B-1FAF-4964-93C3-3E28BC03D6B9}" srcOrd="0" destOrd="0" presId="urn:microsoft.com/office/officeart/2005/8/layout/chevron1"/>
-    <dgm:cxn modelId="{8014BE5C-D31F-48EB-BB4A-9464B5C62E6C}" type="presOf" srcId="{A5B2C75E-273A-4404-BE80-6201C68C9EDB}" destId="{01FCF690-3A52-4BF2-9135-B54D20ED08E1}" srcOrd="0" destOrd="0" presId="urn:microsoft.com/office/officeart/2005/8/layout/chevron1"/>
-    <dgm:cxn modelId="{8A5B0405-4B14-4294-B449-C06C3AB89473}" type="presParOf" srcId="{40F79579-AB6F-4F17-958C-F0D3416B4228}" destId="{2B535912-FFB7-4908-8C3B-3E30209641D3}" srcOrd="0" destOrd="0" presId="urn:microsoft.com/office/officeart/2005/8/layout/chevron1"/>
-    <dgm:cxn modelId="{991820AE-E68B-4CA9-8E11-E36E2EAAA5B0}" type="presParOf" srcId="{40F79579-AB6F-4F17-958C-F0D3416B4228}" destId="{C73F4BF3-7799-44F7-8781-176942C4589B}" srcOrd="1" destOrd="0" presId="urn:microsoft.com/office/officeart/2005/8/layout/chevron1"/>
-    <dgm:cxn modelId="{576598E0-834C-4F8E-AEC4-B3555620A9B2}" type="presParOf" srcId="{40F79579-AB6F-4F17-958C-F0D3416B4228}" destId="{1A0BED00-428A-4143-A6E6-7058B43EE6E3}" srcOrd="2" destOrd="0" presId="urn:microsoft.com/office/officeart/2005/8/layout/chevron1"/>
-    <dgm:cxn modelId="{FA88F180-71DA-4DB0-8AC9-C75369D4A0E6}" type="presParOf" srcId="{40F79579-AB6F-4F17-958C-F0D3416B4228}" destId="{9BFF179C-5738-4598-8B83-B87080C5F443}" srcOrd="3" destOrd="0" presId="urn:microsoft.com/office/officeart/2005/8/layout/chevron1"/>
-    <dgm:cxn modelId="{B05254A1-FDE8-40EA-B90A-D20C46890074}" type="presParOf" srcId="{40F79579-AB6F-4F17-958C-F0D3416B4228}" destId="{01FCF690-3A52-4BF2-9135-B54D20ED08E1}" srcOrd="4" destOrd="0" presId="urn:microsoft.com/office/officeart/2005/8/layout/chevron1"/>
-    <dgm:cxn modelId="{9F958F3D-F3C3-46B3-AE33-E602800DD4B0}" type="presParOf" srcId="{40F79579-AB6F-4F17-958C-F0D3416B4228}" destId="{3A767838-6DEF-4E87-8881-32B6DFC6B014}" srcOrd="5" destOrd="0" presId="urn:microsoft.com/office/officeart/2005/8/layout/chevron1"/>
-    <dgm:cxn modelId="{916CA450-7487-4D08-AEC1-D3F580EEB2E4}" type="presParOf" srcId="{40F79579-AB6F-4F17-958C-F0D3416B4228}" destId="{4B65C82B-1FAF-4964-93C3-3E28BC03D6B9}" srcOrd="6" destOrd="0" presId="urn:microsoft.com/office/officeart/2005/8/layout/chevron1"/>
+    <dgm:cxn modelId="{581E5E19-74DD-4BD4-9E91-C936A92B7D07}" srcId="{0EB6BE91-E96C-4587-B286-5EF2C7262826}" destId="{A5B2C75E-273A-4404-BE80-6201C68C9EDB}" srcOrd="2" destOrd="0" parTransId="{9C1B37AE-8899-425A-9733-080D2E6FF2E6}" sibTransId="{0478BD90-2D3C-4CB6-B8EC-15F6D84F2E91}"/>
+    <dgm:cxn modelId="{8ABD9DDB-7661-4F63-9289-B8C427EF698D}" type="presOf" srcId="{0EB6BE91-E96C-4587-B286-5EF2C7262826}" destId="{40F79579-AB6F-4F17-958C-F0D3416B4228}" srcOrd="0" destOrd="0" presId="urn:microsoft.com/office/officeart/2005/8/layout/chevron1"/>
+    <dgm:cxn modelId="{1CDC1B4C-33A3-47F4-8423-5B84EB50D3FD}" type="presOf" srcId="{FF8ADAA4-FAFF-4095-AF09-16995FC20993}" destId="{2B535912-FFB7-4908-8C3B-3E30209641D3}" srcOrd="0" destOrd="0" presId="urn:microsoft.com/office/officeart/2005/8/layout/chevron1"/>
+    <dgm:cxn modelId="{4BCF09DB-40CA-47AD-A6A2-F51631F1067F}" type="presOf" srcId="{09F6A35B-5D5C-4AEE-B2DF-B5B910646C5D}" destId="{1A0BED00-428A-4143-A6E6-7058B43EE6E3}" srcOrd="0" destOrd="0" presId="urn:microsoft.com/office/officeart/2005/8/layout/chevron1"/>
+    <dgm:cxn modelId="{6AFB5EFE-DC13-4E11-A1AF-50A0DD8FDE7B}" type="presParOf" srcId="{40F79579-AB6F-4F17-958C-F0D3416B4228}" destId="{2B535912-FFB7-4908-8C3B-3E30209641D3}" srcOrd="0" destOrd="0" presId="urn:microsoft.com/office/officeart/2005/8/layout/chevron1"/>
+    <dgm:cxn modelId="{790F8F85-E06D-4E75-8E66-D76F28624DCB}" type="presParOf" srcId="{40F79579-AB6F-4F17-958C-F0D3416B4228}" destId="{C73F4BF3-7799-44F7-8781-176942C4589B}" srcOrd="1" destOrd="0" presId="urn:microsoft.com/office/officeart/2005/8/layout/chevron1"/>
+    <dgm:cxn modelId="{CFCBD135-6FD6-4D1A-8F67-184954FF76E5}" type="presParOf" srcId="{40F79579-AB6F-4F17-958C-F0D3416B4228}" destId="{1A0BED00-428A-4143-A6E6-7058B43EE6E3}" srcOrd="2" destOrd="0" presId="urn:microsoft.com/office/officeart/2005/8/layout/chevron1"/>
+    <dgm:cxn modelId="{25149CCD-BB45-4E4B-8853-27D212A2B26E}" type="presParOf" srcId="{40F79579-AB6F-4F17-958C-F0D3416B4228}" destId="{9BFF179C-5738-4598-8B83-B87080C5F443}" srcOrd="3" destOrd="0" presId="urn:microsoft.com/office/officeart/2005/8/layout/chevron1"/>
+    <dgm:cxn modelId="{654D896D-D259-4202-B9F6-303FEA1B7273}" type="presParOf" srcId="{40F79579-AB6F-4F17-958C-F0D3416B4228}" destId="{01FCF690-3A52-4BF2-9135-B54D20ED08E1}" srcOrd="4" destOrd="0" presId="urn:microsoft.com/office/officeart/2005/8/layout/chevron1"/>
+    <dgm:cxn modelId="{76A6A6ED-EE5D-414D-BDFD-BAF2BAE79EF7}" type="presParOf" srcId="{40F79579-AB6F-4F17-958C-F0D3416B4228}" destId="{3A767838-6DEF-4E87-8881-32B6DFC6B014}" srcOrd="5" destOrd="0" presId="urn:microsoft.com/office/officeart/2005/8/layout/chevron1"/>
+    <dgm:cxn modelId="{439562E1-664A-414C-976E-D8C667D4F83D}" type="presParOf" srcId="{40F79579-AB6F-4F17-958C-F0D3416B4228}" destId="{4B65C82B-1FAF-4964-93C3-3E28BC03D6B9}" srcOrd="6" destOrd="0" presId="urn:microsoft.com/office/officeart/2005/8/layout/chevron1"/>
   </dgm:cxnLst>
   <dgm:bg/>
   <dgm:whole/>
   <dgm:extLst>
     <a:ext uri="http://schemas.microsoft.com/office/drawing/2008/diagram">
-      <dsp:dataModelExt xmlns:dsp="http://schemas.microsoft.com/office/drawing/2008/diagram" relId="rId6" minVer="http://schemas.openxmlformats.org/drawingml/2006/diagram"/>
+      <dsp:dataModelExt xmlns:dsp="http://schemas.microsoft.com/office/drawing/2008/diagram" relId="rId8" minVer="http://schemas.openxmlformats.org/drawingml/2006/diagram"/>
     </a:ext>
   </dgm:extLst>
 </dgm:dataModel>
@@ -1220,7 +1220,7 @@
       </dsp:nvSpPr>
       <dsp:spPr>
         <a:xfrm>
-          <a:off x="1378896" y="0"/>
+          <a:off x="1378897" y="0"/>
           <a:ext cx="1529188" cy="288000"/>
         </a:xfrm>
         <a:prstGeom prst="chevron">
@@ -1286,7 +1286,7 @@
         </a:p>
       </dsp:txBody>
       <dsp:txXfrm>
-        <a:off x="1522896" y="0"/>
+        <a:off x="1522897" y="0"/>
         <a:ext cx="1241188" cy="288000"/>
       </dsp:txXfrm>
     </dsp:sp>
@@ -1297,7 +1297,7 @@
       </dsp:nvSpPr>
       <dsp:spPr>
         <a:xfrm>
-          <a:off x="2755166" y="0"/>
+          <a:off x="2755167" y="0"/>
           <a:ext cx="1529188" cy="288000"/>
         </a:xfrm>
         <a:prstGeom prst="chevron">
@@ -1363,7 +1363,7 @@
         </a:p>
       </dsp:txBody>
       <dsp:txXfrm>
-        <a:off x="2899166" y="0"/>
+        <a:off x="2899167" y="0"/>
         <a:ext cx="1241188" cy="288000"/>
       </dsp:txXfrm>
     </dsp:sp>
@@ -1374,7 +1374,7 @@
       </dsp:nvSpPr>
       <dsp:spPr>
         <a:xfrm>
-          <a:off x="4131436" y="0"/>
+          <a:off x="4131437" y="0"/>
           <a:ext cx="1529188" cy="288000"/>
         </a:xfrm>
         <a:prstGeom prst="chevron">
@@ -1440,7 +1440,7 @@
         </a:p>
       </dsp:txBody>
       <dsp:txXfrm>
-        <a:off x="4275436" y="0"/>
+        <a:off x="4275437" y="0"/>
         <a:ext cx="1241188" cy="288000"/>
       </dsp:txXfrm>
     </dsp:sp>
@@ -2794,8 +2794,8 @@
         </p:nvSpPr>
         <p:spPr>
           <a:xfrm>
-            <a:off x="685800" y="2130425"/>
-            <a:ext cx="7772400" cy="1470025"/>
+            <a:off x="437436" y="827512"/>
+            <a:ext cx="4957604" cy="570996"/>
           </a:xfrm>
         </p:spPr>
         <p:txBody>
@@ -2822,8 +2822,8 @@
         </p:nvSpPr>
         <p:spPr>
           <a:xfrm>
-            <a:off x="1371600" y="3886200"/>
-            <a:ext cx="6400800" cy="1752600"/>
+            <a:off x="874871" y="1509501"/>
+            <a:ext cx="4082733" cy="680755"/>
           </a:xfrm>
         </p:spPr>
         <p:txBody>
@@ -2944,9 +2944,9 @@
           <a:bodyPr/>
           <a:lstStyle/>
           <a:p>
-            <a:fld id="{6C8335E5-3EB6-4D08-918F-E35006D16DD5}" type="datetimeFigureOut">
-              <a:rPr lang="en-US" smtClean="0"/>
-              <a:t>2/6/2017</a:t>
+            <a:fld id="{386DBA8E-C001-4E68-8804-59F1C445E801}" type="datetimeFigureOut">
+              <a:rPr lang="en-US" smtClean="0"/>
+              <a:t>2/9/2017</a:t>
             </a:fld>
             <a:endParaRPr lang="en-US"/>
           </a:p>
@@ -2986,7 +2986,7 @@
           <a:bodyPr/>
           <a:lstStyle/>
           <a:p>
-            <a:fld id="{92BD48C5-E833-4A60-98E6-6650A0296325}" type="slidenum">
+            <a:fld id="{A746E901-D716-41C0-9E0F-C60D13567B4A}" type="slidenum">
               <a:rPr lang="en-US" smtClean="0"/>
               <a:t>‹#›</a:t>
             </a:fld>
@@ -2997,7 +2997,7 @@
     </p:spTree>
     <p:extLst>
       <p:ext uri="{BB962C8B-B14F-4D97-AF65-F5344CB8AC3E}">
-        <p14:creationId xmlns:p14="http://schemas.microsoft.com/office/powerpoint/2010/main" val="3195193068"/>
+        <p14:creationId xmlns:p14="http://schemas.microsoft.com/office/powerpoint/2010/main" val="2863952165"/>
       </p:ext>
     </p:extLst>
   </p:cSld>
@@ -3114,9 +3114,9 @@
           <a:bodyPr/>
           <a:lstStyle/>
           <a:p>
-            <a:fld id="{6C8335E5-3EB6-4D08-918F-E35006D16DD5}" type="datetimeFigureOut">
-              <a:rPr lang="en-US" smtClean="0"/>
-              <a:t>2/6/2017</a:t>
+            <a:fld id="{386DBA8E-C001-4E68-8804-59F1C445E801}" type="datetimeFigureOut">
+              <a:rPr lang="en-US" smtClean="0"/>
+              <a:t>2/9/2017</a:t>
             </a:fld>
             <a:endParaRPr lang="en-US"/>
           </a:p>
@@ -3156,7 +3156,7 @@
           <a:bodyPr/>
           <a:lstStyle/>
           <a:p>
-            <a:fld id="{92BD48C5-E833-4A60-98E6-6650A0296325}" type="slidenum">
+            <a:fld id="{A746E901-D716-41C0-9E0F-C60D13567B4A}" type="slidenum">
               <a:rPr lang="en-US" smtClean="0"/>
               <a:t>‹#›</a:t>
             </a:fld>
@@ -3167,7 +3167,7 @@
     </p:spTree>
     <p:extLst>
       <p:ext uri="{BB962C8B-B14F-4D97-AF65-F5344CB8AC3E}">
-        <p14:creationId xmlns:p14="http://schemas.microsoft.com/office/powerpoint/2010/main" val="3737056548"/>
+        <p14:creationId xmlns:p14="http://schemas.microsoft.com/office/powerpoint/2010/main" val="2133585190"/>
       </p:ext>
     </p:extLst>
   </p:cSld>
@@ -3206,8 +3206,8 @@
         </p:nvSpPr>
         <p:spPr>
           <a:xfrm>
-            <a:off x="6629400" y="274638"/>
-            <a:ext cx="2057400" cy="5851525"/>
+            <a:off x="2697520" y="414373"/>
+            <a:ext cx="836393" cy="8830087"/>
           </a:xfrm>
         </p:spPr>
         <p:txBody>
@@ -3234,8 +3234,8 @@
         </p:nvSpPr>
         <p:spPr>
           <a:xfrm>
-            <a:off x="457200" y="274638"/>
-            <a:ext cx="6019800" cy="5851525"/>
+            <a:off x="186316" y="414373"/>
+            <a:ext cx="2413997" cy="8830087"/>
           </a:xfrm>
         </p:spPr>
         <p:txBody>
@@ -3294,9 +3294,9 @@
           <a:bodyPr/>
           <a:lstStyle/>
           <a:p>
-            <a:fld id="{6C8335E5-3EB6-4D08-918F-E35006D16DD5}" type="datetimeFigureOut">
-              <a:rPr lang="en-US" smtClean="0"/>
-              <a:t>2/6/2017</a:t>
+            <a:fld id="{386DBA8E-C001-4E68-8804-59F1C445E801}" type="datetimeFigureOut">
+              <a:rPr lang="en-US" smtClean="0"/>
+              <a:t>2/9/2017</a:t>
             </a:fld>
             <a:endParaRPr lang="en-US"/>
           </a:p>
@@ -3336,7 +3336,7 @@
           <a:bodyPr/>
           <a:lstStyle/>
           <a:p>
-            <a:fld id="{92BD48C5-E833-4A60-98E6-6650A0296325}" type="slidenum">
+            <a:fld id="{A746E901-D716-41C0-9E0F-C60D13567B4A}" type="slidenum">
               <a:rPr lang="en-US" smtClean="0"/>
               <a:t>‹#›</a:t>
             </a:fld>
@@ -3347,7 +3347,7 @@
     </p:spTree>
     <p:extLst>
       <p:ext uri="{BB962C8B-B14F-4D97-AF65-F5344CB8AC3E}">
-        <p14:creationId xmlns:p14="http://schemas.microsoft.com/office/powerpoint/2010/main" val="1034284780"/>
+        <p14:creationId xmlns:p14="http://schemas.microsoft.com/office/powerpoint/2010/main" val="1606662952"/>
       </p:ext>
     </p:extLst>
   </p:cSld>
@@ -3464,9 +3464,9 @@
           <a:bodyPr/>
           <a:lstStyle/>
           <a:p>
-            <a:fld id="{6C8335E5-3EB6-4D08-918F-E35006D16DD5}" type="datetimeFigureOut">
-              <a:rPr lang="en-US" smtClean="0"/>
-              <a:t>2/6/2017</a:t>
+            <a:fld id="{386DBA8E-C001-4E68-8804-59F1C445E801}" type="datetimeFigureOut">
+              <a:rPr lang="en-US" smtClean="0"/>
+              <a:t>2/9/2017</a:t>
             </a:fld>
             <a:endParaRPr lang="en-US"/>
           </a:p>
@@ -3506,7 +3506,7 @@
           <a:bodyPr/>
           <a:lstStyle/>
           <a:p>
-            <a:fld id="{92BD48C5-E833-4A60-98E6-6650A0296325}" type="slidenum">
+            <a:fld id="{A746E901-D716-41C0-9E0F-C60D13567B4A}" type="slidenum">
               <a:rPr lang="en-US" smtClean="0"/>
               <a:t>‹#›</a:t>
             </a:fld>
@@ -3517,7 +3517,7 @@
     </p:spTree>
     <p:extLst>
       <p:ext uri="{BB962C8B-B14F-4D97-AF65-F5344CB8AC3E}">
-        <p14:creationId xmlns:p14="http://schemas.microsoft.com/office/powerpoint/2010/main" val="2384194162"/>
+        <p14:creationId xmlns:p14="http://schemas.microsoft.com/office/powerpoint/2010/main" val="2705505806"/>
       </p:ext>
     </p:extLst>
   </p:cSld>
@@ -3556,8 +3556,8 @@
         </p:nvSpPr>
         <p:spPr>
           <a:xfrm>
-            <a:off x="722313" y="4406900"/>
-            <a:ext cx="7772400" cy="1362075"/>
+            <a:off x="460725" y="1711755"/>
+            <a:ext cx="4957604" cy="529065"/>
           </a:xfrm>
         </p:spPr>
         <p:txBody>
@@ -3588,8 +3588,8 @@
         </p:nvSpPr>
         <p:spPr>
           <a:xfrm>
-            <a:off x="722313" y="2906713"/>
-            <a:ext cx="7772400" cy="1500187"/>
+            <a:off x="460725" y="1129043"/>
+            <a:ext cx="4957604" cy="582712"/>
           </a:xfrm>
         </p:spPr>
         <p:txBody>
@@ -3710,9 +3710,9 @@
           <a:bodyPr/>
           <a:lstStyle/>
           <a:p>
-            <a:fld id="{6C8335E5-3EB6-4D08-918F-E35006D16DD5}" type="datetimeFigureOut">
-              <a:rPr lang="en-US" smtClean="0"/>
-              <a:t>2/6/2017</a:t>
+            <a:fld id="{386DBA8E-C001-4E68-8804-59F1C445E801}" type="datetimeFigureOut">
+              <a:rPr lang="en-US" smtClean="0"/>
+              <a:t>2/9/2017</a:t>
             </a:fld>
             <a:endParaRPr lang="en-US"/>
           </a:p>
@@ -3752,7 +3752,7 @@
           <a:bodyPr/>
           <a:lstStyle/>
           <a:p>
-            <a:fld id="{92BD48C5-E833-4A60-98E6-6650A0296325}" type="slidenum">
+            <a:fld id="{A746E901-D716-41C0-9E0F-C60D13567B4A}" type="slidenum">
               <a:rPr lang="en-US" smtClean="0"/>
               <a:t>‹#›</a:t>
             </a:fld>
@@ -3763,7 +3763,7 @@
     </p:spTree>
     <p:extLst>
       <p:ext uri="{BB962C8B-B14F-4D97-AF65-F5344CB8AC3E}">
-        <p14:creationId xmlns:p14="http://schemas.microsoft.com/office/powerpoint/2010/main" val="3250675846"/>
+        <p14:creationId xmlns:p14="http://schemas.microsoft.com/office/powerpoint/2010/main" val="238253875"/>
       </p:ext>
     </p:extLst>
   </p:cSld>
@@ -3825,8 +3825,8 @@
         </p:nvSpPr>
         <p:spPr>
           <a:xfrm>
-            <a:off x="457200" y="1600200"/>
-            <a:ext cx="4038600" cy="4525963"/>
+            <a:off x="186316" y="2414708"/>
+            <a:ext cx="1625195" cy="6829751"/>
           </a:xfrm>
         </p:spPr>
         <p:txBody>
@@ -3910,8 +3910,8 @@
         </p:nvSpPr>
         <p:spPr>
           <a:xfrm>
-            <a:off x="4648200" y="1600200"/>
-            <a:ext cx="4038600" cy="4525963"/>
+            <a:off x="1908719" y="2414708"/>
+            <a:ext cx="1625195" cy="6829751"/>
           </a:xfrm>
         </p:spPr>
         <p:txBody>
@@ -3998,9 +3998,9 @@
           <a:bodyPr/>
           <a:lstStyle/>
           <a:p>
-            <a:fld id="{6C8335E5-3EB6-4D08-918F-E35006D16DD5}" type="datetimeFigureOut">
-              <a:rPr lang="en-US" smtClean="0"/>
-              <a:t>2/6/2017</a:t>
+            <a:fld id="{386DBA8E-C001-4E68-8804-59F1C445E801}" type="datetimeFigureOut">
+              <a:rPr lang="en-US" smtClean="0"/>
+              <a:t>2/9/2017</a:t>
             </a:fld>
             <a:endParaRPr lang="en-US"/>
           </a:p>
@@ -4040,7 +4040,7 @@
           <a:bodyPr/>
           <a:lstStyle/>
           <a:p>
-            <a:fld id="{92BD48C5-E833-4A60-98E6-6650A0296325}" type="slidenum">
+            <a:fld id="{A746E901-D716-41C0-9E0F-C60D13567B4A}" type="slidenum">
               <a:rPr lang="en-US" smtClean="0"/>
               <a:t>‹#›</a:t>
             </a:fld>
@@ -4051,7 +4051,7 @@
     </p:spTree>
     <p:extLst>
       <p:ext uri="{BB962C8B-B14F-4D97-AF65-F5344CB8AC3E}">
-        <p14:creationId xmlns:p14="http://schemas.microsoft.com/office/powerpoint/2010/main" val="2811939616"/>
+        <p14:creationId xmlns:p14="http://schemas.microsoft.com/office/powerpoint/2010/main" val="3259131391"/>
       </p:ext>
     </p:extLst>
   </p:cSld>
@@ -4088,7 +4088,12 @@
             <p:ph type="title"/>
           </p:nvPr>
         </p:nvSpPr>
-        <p:spPr/>
+        <p:spPr>
+          <a:xfrm>
+            <a:off x="291624" y="106676"/>
+            <a:ext cx="5249228" cy="443971"/>
+          </a:xfrm>
+        </p:spPr>
         <p:txBody>
           <a:bodyPr/>
           <a:lstStyle>
@@ -4117,8 +4122,8 @@
         </p:nvSpPr>
         <p:spPr>
           <a:xfrm>
-            <a:off x="457200" y="1535113"/>
-            <a:ext cx="4040188" cy="639762"/>
+            <a:off x="291625" y="596278"/>
+            <a:ext cx="2577023" cy="248500"/>
           </a:xfrm>
         </p:spPr>
         <p:txBody>
@@ -4182,8 +4187,8 @@
         </p:nvSpPr>
         <p:spPr>
           <a:xfrm>
-            <a:off x="457200" y="2174875"/>
-            <a:ext cx="4040188" cy="3951288"/>
+            <a:off x="291625" y="844778"/>
+            <a:ext cx="2577023" cy="1534783"/>
           </a:xfrm>
         </p:spPr>
         <p:txBody>
@@ -4267,8 +4272,8 @@
         </p:nvSpPr>
         <p:spPr>
           <a:xfrm>
-            <a:off x="4645025" y="1535113"/>
-            <a:ext cx="4041775" cy="639762"/>
+            <a:off x="2962818" y="596278"/>
+            <a:ext cx="2578035" cy="248500"/>
           </a:xfrm>
         </p:spPr>
         <p:txBody>
@@ -4332,8 +4337,8 @@
         </p:nvSpPr>
         <p:spPr>
           <a:xfrm>
-            <a:off x="4645025" y="2174875"/>
-            <a:ext cx="4041775" cy="3951288"/>
+            <a:off x="2962818" y="844778"/>
+            <a:ext cx="2578035" cy="1534783"/>
           </a:xfrm>
         </p:spPr>
         <p:txBody>
@@ -4420,9 +4425,9 @@
           <a:bodyPr/>
           <a:lstStyle/>
           <a:p>
-            <a:fld id="{6C8335E5-3EB6-4D08-918F-E35006D16DD5}" type="datetimeFigureOut">
-              <a:rPr lang="en-US" smtClean="0"/>
-              <a:t>2/6/2017</a:t>
+            <a:fld id="{386DBA8E-C001-4E68-8804-59F1C445E801}" type="datetimeFigureOut">
+              <a:rPr lang="en-US" smtClean="0"/>
+              <a:t>2/9/2017</a:t>
             </a:fld>
             <a:endParaRPr lang="en-US"/>
           </a:p>
@@ -4462,7 +4467,7 @@
           <a:bodyPr/>
           <a:lstStyle/>
           <a:p>
-            <a:fld id="{92BD48C5-E833-4A60-98E6-6650A0296325}" type="slidenum">
+            <a:fld id="{A746E901-D716-41C0-9E0F-C60D13567B4A}" type="slidenum">
               <a:rPr lang="en-US" smtClean="0"/>
               <a:t>‹#›</a:t>
             </a:fld>
@@ -4473,7 +4478,7 @@
     </p:spTree>
     <p:extLst>
       <p:ext uri="{BB962C8B-B14F-4D97-AF65-F5344CB8AC3E}">
-        <p14:creationId xmlns:p14="http://schemas.microsoft.com/office/powerpoint/2010/main" val="3081559569"/>
+        <p14:creationId xmlns:p14="http://schemas.microsoft.com/office/powerpoint/2010/main" val="375435350"/>
       </p:ext>
     </p:extLst>
   </p:cSld>
@@ -4538,9 +4543,9 @@
           <a:bodyPr/>
           <a:lstStyle/>
           <a:p>
-            <a:fld id="{6C8335E5-3EB6-4D08-918F-E35006D16DD5}" type="datetimeFigureOut">
-              <a:rPr lang="en-US" smtClean="0"/>
-              <a:t>2/6/2017</a:t>
+            <a:fld id="{386DBA8E-C001-4E68-8804-59F1C445E801}" type="datetimeFigureOut">
+              <a:rPr lang="en-US" smtClean="0"/>
+              <a:t>2/9/2017</a:t>
             </a:fld>
             <a:endParaRPr lang="en-US"/>
           </a:p>
@@ -4580,7 +4585,7 @@
           <a:bodyPr/>
           <a:lstStyle/>
           <a:p>
-            <a:fld id="{92BD48C5-E833-4A60-98E6-6650A0296325}" type="slidenum">
+            <a:fld id="{A746E901-D716-41C0-9E0F-C60D13567B4A}" type="slidenum">
               <a:rPr lang="en-US" smtClean="0"/>
               <a:t>‹#›</a:t>
             </a:fld>
@@ -4591,7 +4596,7 @@
     </p:spTree>
     <p:extLst>
       <p:ext uri="{BB962C8B-B14F-4D97-AF65-F5344CB8AC3E}">
-        <p14:creationId xmlns:p14="http://schemas.microsoft.com/office/powerpoint/2010/main" val="1391063910"/>
+        <p14:creationId xmlns:p14="http://schemas.microsoft.com/office/powerpoint/2010/main" val="1696591400"/>
       </p:ext>
     </p:extLst>
   </p:cSld>
@@ -4633,9 +4638,9 @@
           <a:bodyPr/>
           <a:lstStyle/>
           <a:p>
-            <a:fld id="{6C8335E5-3EB6-4D08-918F-E35006D16DD5}" type="datetimeFigureOut">
-              <a:rPr lang="en-US" smtClean="0"/>
-              <a:t>2/6/2017</a:t>
+            <a:fld id="{386DBA8E-C001-4E68-8804-59F1C445E801}" type="datetimeFigureOut">
+              <a:rPr lang="en-US" smtClean="0"/>
+              <a:t>2/9/2017</a:t>
             </a:fld>
             <a:endParaRPr lang="en-US"/>
           </a:p>
@@ -4675,7 +4680,7 @@
           <a:bodyPr/>
           <a:lstStyle/>
           <a:p>
-            <a:fld id="{92BD48C5-E833-4A60-98E6-6650A0296325}" type="slidenum">
+            <a:fld id="{A746E901-D716-41C0-9E0F-C60D13567B4A}" type="slidenum">
               <a:rPr lang="en-US" smtClean="0"/>
               <a:t>‹#›</a:t>
             </a:fld>
@@ -4686,7 +4691,7 @@
     </p:spTree>
     <p:extLst>
       <p:ext uri="{BB962C8B-B14F-4D97-AF65-F5344CB8AC3E}">
-        <p14:creationId xmlns:p14="http://schemas.microsoft.com/office/powerpoint/2010/main" val="4168156507"/>
+        <p14:creationId xmlns:p14="http://schemas.microsoft.com/office/powerpoint/2010/main" val="2675070685"/>
       </p:ext>
     </p:extLst>
   </p:cSld>
@@ -4725,8 +4730,8 @@
         </p:nvSpPr>
         <p:spPr>
           <a:xfrm>
-            <a:off x="457200" y="273050"/>
-            <a:ext cx="3008313" cy="1162050"/>
+            <a:off x="291624" y="106060"/>
+            <a:ext cx="1918844" cy="451370"/>
           </a:xfrm>
         </p:spPr>
         <p:txBody>
@@ -4757,8 +4762,8 @@
         </p:nvSpPr>
         <p:spPr>
           <a:xfrm>
-            <a:off x="3575050" y="273050"/>
-            <a:ext cx="5111750" cy="5853113"/>
+            <a:off x="2280335" y="106060"/>
+            <a:ext cx="3260516" cy="2273501"/>
           </a:xfrm>
         </p:spPr>
         <p:txBody>
@@ -4842,8 +4847,8 @@
         </p:nvSpPr>
         <p:spPr>
           <a:xfrm>
-            <a:off x="457200" y="1435100"/>
-            <a:ext cx="3008313" cy="4691063"/>
+            <a:off x="291624" y="557431"/>
+            <a:ext cx="1918844" cy="1822130"/>
           </a:xfrm>
         </p:spPr>
         <p:txBody>
@@ -4910,9 +4915,9 @@
           <a:bodyPr/>
           <a:lstStyle/>
           <a:p>
-            <a:fld id="{6C8335E5-3EB6-4D08-918F-E35006D16DD5}" type="datetimeFigureOut">
-              <a:rPr lang="en-US" smtClean="0"/>
-              <a:t>2/6/2017</a:t>
+            <a:fld id="{386DBA8E-C001-4E68-8804-59F1C445E801}" type="datetimeFigureOut">
+              <a:rPr lang="en-US" smtClean="0"/>
+              <a:t>2/9/2017</a:t>
             </a:fld>
             <a:endParaRPr lang="en-US"/>
           </a:p>
@@ -4952,7 +4957,7 @@
           <a:bodyPr/>
           <a:lstStyle/>
           <a:p>
-            <a:fld id="{92BD48C5-E833-4A60-98E6-6650A0296325}" type="slidenum">
+            <a:fld id="{A746E901-D716-41C0-9E0F-C60D13567B4A}" type="slidenum">
               <a:rPr lang="en-US" smtClean="0"/>
               <a:t>‹#›</a:t>
             </a:fld>
@@ -4963,7 +4968,7 @@
     </p:spTree>
     <p:extLst>
       <p:ext uri="{BB962C8B-B14F-4D97-AF65-F5344CB8AC3E}">
-        <p14:creationId xmlns:p14="http://schemas.microsoft.com/office/powerpoint/2010/main" val="1248939493"/>
+        <p14:creationId xmlns:p14="http://schemas.microsoft.com/office/powerpoint/2010/main" val="371003852"/>
       </p:ext>
     </p:extLst>
   </p:cSld>
@@ -5002,8 +5007,8 @@
         </p:nvSpPr>
         <p:spPr>
           <a:xfrm>
-            <a:off x="1792288" y="4800600"/>
-            <a:ext cx="5486400" cy="566738"/>
+            <a:off x="1143207" y="1864677"/>
+            <a:ext cx="3499485" cy="220136"/>
           </a:xfrm>
         </p:spPr>
         <p:txBody>
@@ -5034,8 +5039,8 @@
         </p:nvSpPr>
         <p:spPr>
           <a:xfrm>
-            <a:off x="1792288" y="612775"/>
-            <a:ext cx="5486400" cy="4114800"/>
+            <a:off x="1143207" y="238018"/>
+            <a:ext cx="3499485" cy="1598295"/>
           </a:xfrm>
         </p:spPr>
         <p:txBody>
@@ -5095,8 +5100,8 @@
         </p:nvSpPr>
         <p:spPr>
           <a:xfrm>
-            <a:off x="1792288" y="5367338"/>
-            <a:ext cx="5486400" cy="804862"/>
+            <a:off x="1143207" y="2084813"/>
+            <a:ext cx="3499485" cy="312629"/>
           </a:xfrm>
         </p:spPr>
         <p:txBody>
@@ -5163,9 +5168,9 @@
           <a:bodyPr/>
           <a:lstStyle/>
           <a:p>
-            <a:fld id="{6C8335E5-3EB6-4D08-918F-E35006D16DD5}" type="datetimeFigureOut">
-              <a:rPr lang="en-US" smtClean="0"/>
-              <a:t>2/6/2017</a:t>
+            <a:fld id="{386DBA8E-C001-4E68-8804-59F1C445E801}" type="datetimeFigureOut">
+              <a:rPr lang="en-US" smtClean="0"/>
+              <a:t>2/9/2017</a:t>
             </a:fld>
             <a:endParaRPr lang="en-US"/>
           </a:p>
@@ -5205,7 +5210,7 @@
           <a:bodyPr/>
           <a:lstStyle/>
           <a:p>
-            <a:fld id="{92BD48C5-E833-4A60-98E6-6650A0296325}" type="slidenum">
+            <a:fld id="{A746E901-D716-41C0-9E0F-C60D13567B4A}" type="slidenum">
               <a:rPr lang="en-US" smtClean="0"/>
               <a:t>‹#›</a:t>
             </a:fld>
@@ -5216,7 +5221,7 @@
     </p:spTree>
     <p:extLst>
       <p:ext uri="{BB962C8B-B14F-4D97-AF65-F5344CB8AC3E}">
-        <p14:creationId xmlns:p14="http://schemas.microsoft.com/office/powerpoint/2010/main" val="363843424"/>
+        <p14:creationId xmlns:p14="http://schemas.microsoft.com/office/powerpoint/2010/main" val="3653087689"/>
       </p:ext>
     </p:extLst>
   </p:cSld>
@@ -5260,8 +5265,8 @@
         </p:nvSpPr>
         <p:spPr>
           <a:xfrm>
-            <a:off x="457200" y="274638"/>
-            <a:ext cx="8229600" cy="1143000"/>
+            <a:off x="291624" y="106676"/>
+            <a:ext cx="5249228" cy="443971"/>
           </a:xfrm>
           <a:prstGeom prst="rect">
             <a:avLst/>
@@ -5293,8 +5298,8 @@
         </p:nvSpPr>
         <p:spPr>
           <a:xfrm>
-            <a:off x="457200" y="1600200"/>
-            <a:ext cx="8229600" cy="4525963"/>
+            <a:off x="291624" y="621560"/>
+            <a:ext cx="5249228" cy="1758001"/>
           </a:xfrm>
           <a:prstGeom prst="rect">
             <a:avLst/>
@@ -5355,8 +5360,8 @@
         </p:nvSpPr>
         <p:spPr>
           <a:xfrm>
-            <a:off x="457200" y="6356350"/>
-            <a:ext cx="2133600" cy="365125"/>
+            <a:off x="291625" y="2468971"/>
+            <a:ext cx="1360911" cy="141824"/>
           </a:xfrm>
           <a:prstGeom prst="rect">
             <a:avLst/>
@@ -5376,9 +5381,9 @@
             </a:lvl1pPr>
           </a:lstStyle>
           <a:p>
-            <a:fld id="{6C8335E5-3EB6-4D08-918F-E35006D16DD5}" type="datetimeFigureOut">
-              <a:rPr lang="en-US" smtClean="0"/>
-              <a:t>2/6/2017</a:t>
+            <a:fld id="{386DBA8E-C001-4E68-8804-59F1C445E801}" type="datetimeFigureOut">
+              <a:rPr lang="en-US" smtClean="0"/>
+              <a:t>2/9/2017</a:t>
             </a:fld>
             <a:endParaRPr lang="en-US"/>
           </a:p>
@@ -5396,8 +5401,8 @@
         </p:nvSpPr>
         <p:spPr>
           <a:xfrm>
-            <a:off x="3124200" y="6356350"/>
-            <a:ext cx="2895600" cy="365125"/>
+            <a:off x="1992763" y="2468971"/>
+            <a:ext cx="1846950" cy="141824"/>
           </a:xfrm>
           <a:prstGeom prst="rect">
             <a:avLst/>
@@ -5433,8 +5438,8 @@
         </p:nvSpPr>
         <p:spPr>
           <a:xfrm>
-            <a:off x="6553200" y="6356350"/>
-            <a:ext cx="2133600" cy="365125"/>
+            <a:off x="4179940" y="2468971"/>
+            <a:ext cx="1360911" cy="141824"/>
           </a:xfrm>
           <a:prstGeom prst="rect">
             <a:avLst/>
@@ -5454,7 +5459,7 @@
             </a:lvl1pPr>
           </a:lstStyle>
           <a:p>
-            <a:fld id="{92BD48C5-E833-4A60-98E6-6650A0296325}" type="slidenum">
+            <a:fld id="{A746E901-D716-41C0-9E0F-C60D13567B4A}" type="slidenum">
               <a:rPr lang="en-US" smtClean="0"/>
               <a:t>‹#›</a:t>
             </a:fld>
@@ -5465,7 +5470,7 @@
     </p:spTree>
     <p:extLst>
       <p:ext uri="{BB962C8B-B14F-4D97-AF65-F5344CB8AC3E}">
-        <p14:creationId xmlns:p14="http://schemas.microsoft.com/office/powerpoint/2010/main" val="271520786"/>
+        <p14:creationId xmlns:p14="http://schemas.microsoft.com/office/powerpoint/2010/main" val="2762370001"/>
       </p:ext>
     </p:extLst>
   </p:cSld>
@@ -5755,14 +5760,14 @@
       </p:grpSpPr>
       <p:sp>
         <p:nvSpPr>
-          <p:cNvPr id="3" name="Rectangle 2"/>
+          <p:cNvPr id="4" name="Rectangle 3"/>
           <p:cNvSpPr/>
           <p:nvPr/>
         </p:nvSpPr>
         <p:spPr>
           <a:xfrm>
-            <a:off x="1663105" y="2348880"/>
-            <a:ext cx="5832648" cy="2664296"/>
+            <a:off x="3448" y="0"/>
+            <a:ext cx="5832647" cy="2664297"/>
           </a:xfrm>
           <a:prstGeom prst="rect">
             <a:avLst/>
@@ -5792,7 +5797,7 @@
           </a:fontRef>
         </p:style>
         <p:txBody>
-          <a:bodyPr rtlCol="0" anchor="ctr"/>
+          <a:bodyPr lIns="91420" tIns="45712" rIns="91420" bIns="45712" rtlCol="0" anchor="ctr"/>
           <a:lstStyle/>
           <a:p>
             <a:pPr algn="ctr"/>
@@ -5800,38 +5805,120 @@
           </a:p>
         </p:txBody>
       </p:sp>
+      <p:pic>
+        <p:nvPicPr>
+          <p:cNvPr id="1028" name="Picture 4" descr="http://www.apkreleases.com/wp-content/uploads/2015/03/download-play-store.png"/>
+          <p:cNvPicPr>
+            <a:picLocks noChangeAspect="1" noChangeArrowheads="1"/>
+          </p:cNvPicPr>
+          <p:nvPr/>
+        </p:nvPicPr>
+        <p:blipFill>
+          <a:blip r:embed="rId2" cstate="print">
+            <a:extLst>
+              <a:ext uri="{28A0092B-C50C-407E-A947-70E740481C1C}">
+                <a14:useLocalDpi xmlns:a14="http://schemas.microsoft.com/office/drawing/2010/main" val="0"/>
+              </a:ext>
+            </a:extLst>
+          </a:blip>
+          <a:srcRect/>
+          <a:stretch>
+            <a:fillRect/>
+          </a:stretch>
+        </p:blipFill>
+        <p:spPr bwMode="auto">
+          <a:xfrm>
+            <a:off x="4468620" y="1106273"/>
+            <a:ext cx="1008000" cy="369999"/>
+          </a:xfrm>
+          <a:prstGeom prst="rect">
+            <a:avLst/>
+          </a:prstGeom>
+          <a:noFill/>
+          <a:extLst>
+            <a:ext uri="{909E8E84-426E-40DD-AFC4-6F175D3DCCD1}">
+              <a14:hiddenFill xmlns:a14="http://schemas.microsoft.com/office/drawing/2010/main">
+                <a:solidFill>
+                  <a:srgbClr val="FFFFFF"/>
+                </a:solidFill>
+              </a14:hiddenFill>
+            </a:ext>
+          </a:extLst>
+        </p:spPr>
+      </p:pic>
+      <p:pic>
+        <p:nvPicPr>
+          <p:cNvPr id="1026" name="Picture 2" descr="Bildergebnis für apple app store"/>
+          <p:cNvPicPr>
+            <a:picLocks noChangeAspect="1" noChangeArrowheads="1"/>
+          </p:cNvPicPr>
+          <p:nvPr/>
+        </p:nvPicPr>
+        <p:blipFill>
+          <a:blip r:embed="rId3" cstate="print">
+            <a:extLst>
+              <a:ext uri="{28A0092B-C50C-407E-A947-70E740481C1C}">
+                <a14:useLocalDpi xmlns:a14="http://schemas.microsoft.com/office/drawing/2010/main" val="0"/>
+              </a:ext>
+            </a:extLst>
+          </a:blip>
+          <a:srcRect/>
+          <a:stretch>
+            <a:fillRect/>
+          </a:stretch>
+        </p:blipFill>
+        <p:spPr bwMode="auto">
+          <a:xfrm>
+            <a:off x="4481307" y="684173"/>
+            <a:ext cx="972000" cy="337770"/>
+          </a:xfrm>
+          <a:prstGeom prst="rect">
+            <a:avLst/>
+          </a:prstGeom>
+          <a:noFill/>
+          <a:extLst>
+            <a:ext uri="{909E8E84-426E-40DD-AFC4-6F175D3DCCD1}">
+              <a14:hiddenFill xmlns:a14="http://schemas.microsoft.com/office/drawing/2010/main">
+                <a:solidFill>
+                  <a:srgbClr val="FFFFFF"/>
+                </a:solidFill>
+              </a14:hiddenFill>
+            </a:ext>
+          </a:extLst>
+        </p:spPr>
+      </p:pic>
       <p:graphicFrame>
         <p:nvGraphicFramePr>
-          <p:cNvPr id="4" name="Diagram 3"/>
+          <p:cNvPr id="5" name="Diagram 4"/>
           <p:cNvGraphicFramePr/>
           <p:nvPr>
             <p:extLst>
               <p:ext uri="{D42A27DB-BD31-4B8C-83A1-F6EECF244321}">
-                <p14:modId xmlns:p14="http://schemas.microsoft.com/office/powerpoint/2010/main" val="1348333400"/>
+                <p14:modId xmlns:p14="http://schemas.microsoft.com/office/powerpoint/2010/main" val="1167990110"/>
               </p:ext>
             </p:extLst>
           </p:nvPr>
         </p:nvGraphicFramePr>
         <p:xfrm>
-          <a:off x="1740374" y="2489708"/>
-          <a:ext cx="5663252" cy="288000"/>
+          <a:off x="80718" y="140831"/>
+          <a:ext cx="5663253" cy="288001"/>
         </p:xfrm>
         <a:graphic>
           <a:graphicData uri="http://schemas.openxmlformats.org/drawingml/2006/diagram">
-            <dgm:relIds xmlns:dgm="http://schemas.openxmlformats.org/drawingml/2006/diagram" xmlns:r="http://schemas.openxmlformats.org/officeDocument/2006/relationships" r:dm="rId2" r:lo="rId3" r:qs="rId4" r:cs="rId5"/>
+            <dgm:relIds xmlns:dgm="http://schemas.openxmlformats.org/drawingml/2006/diagram" xmlns:r="http://schemas.openxmlformats.org/officeDocument/2006/relationships" r:dm="rId4" r:lo="rId5" r:qs="rId6" r:cs="rId7"/>
           </a:graphicData>
         </a:graphic>
       </p:graphicFrame>
       <p:pic>
         <p:nvPicPr>
-          <p:cNvPr id="1027" name="Picture 3"/>
+          <p:cNvPr id="6" name="Picture 3"/>
           <p:cNvPicPr>
             <a:picLocks noChangeAspect="1" noChangeArrowheads="1"/>
           </p:cNvPicPr>
           <p:nvPr/>
         </p:nvPicPr>
         <p:blipFill rotWithShape="1">
-          <a:blip r:embed="rId7" cstate="print">
+          <a:blip r:embed="rId9" cstate="print">
             <a:extLst>
               <a:ext uri="{28A0092B-C50C-407E-A947-70E740481C1C}">
                 <a14:useLocalDpi xmlns:a14="http://schemas.microsoft.com/office/drawing/2010/main" val="0"/>
@@ -5843,8 +5930,8 @@
         </p:blipFill>
         <p:spPr bwMode="auto">
           <a:xfrm>
-            <a:off x="4901804" y="3096284"/>
-            <a:ext cx="648000" cy="758115"/>
+            <a:off x="3242147" y="747404"/>
+            <a:ext cx="648000" cy="758116"/>
           </a:xfrm>
           <a:prstGeom prst="rect">
             <a:avLst/>
@@ -5876,89 +5963,7 @@
       </p:pic>
       <p:pic>
         <p:nvPicPr>
-          <p:cNvPr id="1029" name="Picture 5" descr="https://upload.wikimedia.org/wikipedia/commons/thumb/3/3c/Download_on_the_App_Store_Badge.svg/2000px-Download_on_the_App_Store_Badge.svg.png"/>
-          <p:cNvPicPr>
-            <a:picLocks noChangeAspect="1" noChangeArrowheads="1"/>
-          </p:cNvPicPr>
-          <p:nvPr/>
-        </p:nvPicPr>
-        <p:blipFill>
-          <a:blip r:embed="rId8" cstate="print">
-            <a:extLst>
-              <a:ext uri="{28A0092B-C50C-407E-A947-70E740481C1C}">
-                <a14:useLocalDpi xmlns:a14="http://schemas.microsoft.com/office/drawing/2010/main" val="0"/>
-              </a:ext>
-            </a:extLst>
-          </a:blip>
-          <a:srcRect/>
-          <a:stretch>
-            <a:fillRect/>
-          </a:stretch>
-        </p:blipFill>
-        <p:spPr bwMode="auto">
-          <a:xfrm>
-            <a:off x="6137276" y="3065772"/>
-            <a:ext cx="990000" cy="293535"/>
-          </a:xfrm>
-          <a:prstGeom prst="rect">
-            <a:avLst/>
-          </a:prstGeom>
-          <a:noFill/>
-          <a:extLst>
-            <a:ext uri="{909E8E84-426E-40DD-AFC4-6F175D3DCCD1}">
-              <a14:hiddenFill xmlns:a14="http://schemas.microsoft.com/office/drawing/2010/main">
-                <a:solidFill>
-                  <a:srgbClr val="FFFFFF"/>
-                </a:solidFill>
-              </a14:hiddenFill>
-            </a:ext>
-          </a:extLst>
-        </p:spPr>
-      </p:pic>
-      <p:pic>
-        <p:nvPicPr>
-          <p:cNvPr id="1031" name="Picture 7" descr="https://static.cv-library.co.uk/images/app-store-android-download.png"/>
-          <p:cNvPicPr>
-            <a:picLocks noChangeAspect="1" noChangeArrowheads="1"/>
-          </p:cNvPicPr>
-          <p:nvPr/>
-        </p:nvPicPr>
-        <p:blipFill>
-          <a:blip r:embed="rId9" cstate="print">
-            <a:extLst>
-              <a:ext uri="{28A0092B-C50C-407E-A947-70E740481C1C}">
-                <a14:useLocalDpi xmlns:a14="http://schemas.microsoft.com/office/drawing/2010/main" val="0"/>
-              </a:ext>
-            </a:extLst>
-          </a:blip>
-          <a:srcRect/>
-          <a:stretch>
-            <a:fillRect/>
-          </a:stretch>
-        </p:blipFill>
-        <p:spPr bwMode="auto">
-          <a:xfrm>
-            <a:off x="6137276" y="3489869"/>
-            <a:ext cx="990000" cy="293403"/>
-          </a:xfrm>
-          <a:prstGeom prst="rect">
-            <a:avLst/>
-          </a:prstGeom>
-          <a:noFill/>
-          <a:extLst>
-            <a:ext uri="{909E8E84-426E-40DD-AFC4-6F175D3DCCD1}">
-              <a14:hiddenFill xmlns:a14="http://schemas.microsoft.com/office/drawing/2010/main">
-                <a:solidFill>
-                  <a:srgbClr val="FFFFFF"/>
-                </a:solidFill>
-              </a14:hiddenFill>
-            </a:ext>
-          </a:extLst>
-        </p:spPr>
-      </p:pic>
-      <p:pic>
-        <p:nvPicPr>
-          <p:cNvPr id="1033" name="Picture 9" descr="https://i0.wp.com/www.artit-k.com/wp-content/uploads/2016/07/Cover-Firebase_Hosting.png?fit=650%2C300"/>
+          <p:cNvPr id="9" name="Picture 9" descr="https://i0.wp.com/www.artit-k.com/wp-content/uploads/2016/07/Cover-Firebase_Hosting.png?fit=650%2C300"/>
           <p:cNvPicPr>
             <a:picLocks noChangeAspect="1" noChangeArrowheads="1"/>
           </p:cNvPicPr>
@@ -5979,8 +5984,8 @@
         </p:blipFill>
         <p:spPr bwMode="auto">
           <a:xfrm>
-            <a:off x="6137276" y="3913834"/>
-            <a:ext cx="990000" cy="456923"/>
+            <a:off x="4477620" y="1564958"/>
+            <a:ext cx="990000" cy="456924"/>
           </a:xfrm>
           <a:prstGeom prst="roundRect">
             <a:avLst>
@@ -6006,14 +6011,14 @@
       </p:pic>
       <p:sp>
         <p:nvSpPr>
-          <p:cNvPr id="11" name="Rounded Rectangle 10"/>
+          <p:cNvPr id="10" name="Rounded Rectangle 9"/>
           <p:cNvSpPr/>
           <p:nvPr/>
         </p:nvSpPr>
         <p:spPr>
           <a:xfrm>
-            <a:off x="6137276" y="4501319"/>
-            <a:ext cx="990000" cy="235742"/>
+            <a:off x="4477620" y="2152439"/>
+            <a:ext cx="990000" cy="235741"/>
           </a:xfrm>
           <a:prstGeom prst="roundRect">
             <a:avLst/>
@@ -6041,12 +6046,12 @@
           </a:fontRef>
         </p:style>
         <p:txBody>
-          <a:bodyPr rtlCol="0" anchor="ctr"/>
+          <a:bodyPr lIns="91420" tIns="45712" rIns="91420" bIns="45712" rtlCol="0" anchor="ctr"/>
           <a:lstStyle/>
           <a:p>
             <a:pPr algn="ctr"/>
             <a:r>
-              <a:rPr lang="de-DE" sz="1200" smtClean="0">
+              <a:rPr lang="de-DE" sz="1100">
                 <a:solidFill>
                   <a:schemeClr val="accent3">
                     <a:lumMod val="50000"/>
@@ -6055,7 +6060,7 @@
               </a:rPr>
               <a:t>own Server</a:t>
             </a:r>
-            <a:endParaRPr lang="en-US" sz="1200">
+            <a:endParaRPr lang="en-US" sz="1100">
               <a:solidFill>
                 <a:schemeClr val="accent3">
                   <a:lumMod val="50000"/>
@@ -6067,7 +6072,7 @@
       </p:sp>
       <p:pic>
         <p:nvPicPr>
-          <p:cNvPr id="1044" name="Picture 20"/>
+          <p:cNvPr id="11" name="Picture 20"/>
           <p:cNvPicPr>
             <a:picLocks noChangeAspect="1" noChangeArrowheads="1"/>
           </p:cNvPicPr>
@@ -6086,8 +6091,8 @@
         </p:blipFill>
         <p:spPr bwMode="auto">
           <a:xfrm>
-            <a:off x="3539913" y="4054729"/>
-            <a:ext cx="720000" cy="766588"/>
+            <a:off x="1880256" y="1705853"/>
+            <a:ext cx="720000" cy="766589"/>
           </a:xfrm>
           <a:prstGeom prst="rect">
             <a:avLst/>
@@ -6119,7 +6124,7 @@
       </p:pic>
       <p:pic>
         <p:nvPicPr>
-          <p:cNvPr id="1046" name="Picture 22" descr="http://www.swtestacademy.com/wp-content/uploads/2016/03/eslint_logo.png"/>
+          <p:cNvPr id="12" name="Picture 22" descr="http://www.swtestacademy.com/wp-content/uploads/2016/03/eslint_logo.png"/>
           <p:cNvPicPr>
             <a:picLocks noChangeAspect="1" noChangeArrowheads="1"/>
           </p:cNvPicPr>
@@ -6138,7 +6143,7 @@
         </p:blipFill>
         <p:spPr bwMode="auto">
           <a:xfrm>
-            <a:off x="3539913" y="3113603"/>
+            <a:off x="1880256" y="764726"/>
             <a:ext cx="720000" cy="723476"/>
           </a:xfrm>
           <a:prstGeom prst="rect">
@@ -6158,7 +6163,7 @@
       </p:pic>
       <p:pic>
         <p:nvPicPr>
-          <p:cNvPr id="1048" name="Picture 24" descr="http://idangero.us/swiper/i/logo-f7.png"/>
+          <p:cNvPr id="13" name="Picture 24" descr="http://idangero.us/swiper/i/logo-f7.png"/>
           <p:cNvPicPr>
             <a:picLocks noChangeAspect="1" noChangeArrowheads="1"/>
           </p:cNvPicPr>
@@ -6179,8 +6184,8 @@
         </p:blipFill>
         <p:spPr bwMode="auto">
           <a:xfrm>
-            <a:off x="2086716" y="3115341"/>
-            <a:ext cx="720000" cy="720000"/>
+            <a:off x="427058" y="766464"/>
+            <a:ext cx="720000" cy="720001"/>
           </a:xfrm>
           <a:prstGeom prst="rect">
             <a:avLst/>
@@ -6199,7 +6204,7 @@
       </p:pic>
       <p:pic>
         <p:nvPicPr>
-          <p:cNvPr id="1050" name="Picture 26" descr="https://vuejs.org/images/logo.png"/>
+          <p:cNvPr id="14" name="Picture 26" descr="https://vuejs.org/images/logo.png"/>
           <p:cNvPicPr>
             <a:picLocks noChangeAspect="1" noChangeArrowheads="1"/>
           </p:cNvPicPr>
@@ -6220,8 +6225,8 @@
         </p:blipFill>
         <p:spPr bwMode="auto">
           <a:xfrm>
-            <a:off x="2086716" y="4078023"/>
-            <a:ext cx="720000" cy="720000"/>
+            <a:off x="427058" y="1729147"/>
+            <a:ext cx="720000" cy="720001"/>
           </a:xfrm>
           <a:prstGeom prst="rect">
             <a:avLst/>
@@ -6240,7 +6245,7 @@
       </p:pic>
       <p:pic>
         <p:nvPicPr>
-          <p:cNvPr id="1052" name="Picture 28" descr="https://cdn.auth0.com/blog/converting-your-app-to-mobile/logo.png"/>
+          <p:cNvPr id="15" name="Picture 28" descr="https://cdn.auth0.com/blog/converting-your-app-to-mobile/logo.png"/>
           <p:cNvPicPr>
             <a:picLocks noChangeAspect="1" noChangeArrowheads="1"/>
           </p:cNvPicPr>
@@ -6259,8 +6264,8 @@
         </p:blipFill>
         <p:spPr bwMode="auto">
           <a:xfrm>
-            <a:off x="4793804" y="4003699"/>
-            <a:ext cx="864000" cy="868649"/>
+            <a:off x="3134147" y="1654820"/>
+            <a:ext cx="864000" cy="868650"/>
           </a:xfrm>
           <a:prstGeom prst="rect">
             <a:avLst/>
@@ -6279,14 +6284,14 @@
       </p:pic>
       <p:sp>
         <p:nvSpPr>
-          <p:cNvPr id="14" name="Snip Diagonal Corner Rectangle 13"/>
+          <p:cNvPr id="21" name="Snip Diagonal Corner Rectangle 20"/>
           <p:cNvSpPr/>
           <p:nvPr/>
         </p:nvSpPr>
         <p:spPr>
           <a:xfrm rot="18900000">
-            <a:off x="6584878" y="3132057"/>
-            <a:ext cx="595012" cy="139761"/>
+            <a:off x="4745754" y="1218273"/>
+            <a:ext cx="595012" cy="139762"/>
           </a:xfrm>
           <a:prstGeom prst="snip2DiagRect">
             <a:avLst>
@@ -6326,7 +6331,7 @@
           <a:p>
             <a:pPr algn="ctr"/>
             <a:r>
-              <a:rPr lang="de-DE" sz="1100" smtClean="0">
+              <a:rPr lang="de-DE" sz="1100">
                 <a:solidFill>
                   <a:srgbClr val="C00000"/>
                 </a:solidFill>
@@ -6343,29 +6348,28 @@
       </p:sp>
       <p:sp>
         <p:nvSpPr>
-          <p:cNvPr id="15" name="Snip Diagonal Corner Rectangle 14"/>
+          <p:cNvPr id="2" name="Chevron 1"/>
           <p:cNvSpPr/>
           <p:nvPr/>
         </p:nvSpPr>
         <p:spPr>
-          <a:xfrm rot="18900000">
-            <a:off x="6604720" y="3569319"/>
-            <a:ext cx="555331" cy="139761"/>
+          <a:xfrm>
+            <a:off x="1363811" y="668213"/>
+            <a:ext cx="180000" cy="1788269"/>
           </a:xfrm>
-          <a:prstGeom prst="snip2DiagRect">
+          <a:prstGeom prst="chevron">
             <a:avLst>
-              <a:gd name="adj1" fmla="val 0"/>
-              <a:gd name="adj2" fmla="val 39745"/>
+              <a:gd name="adj" fmla="val 85273"/>
             </a:avLst>
           </a:prstGeom>
           <a:solidFill>
-            <a:schemeClr val="bg1">
-              <a:alpha val="75000"/>
+            <a:schemeClr val="accent1">
+              <a:lumMod val="20000"/>
+              <a:lumOff val="80000"/>
             </a:schemeClr>
           </a:solidFill>
           <a:ln>
             <a:noFill/>
-            <a:prstDash val="sysDash"/>
           </a:ln>
         </p:spPr>
         <p:style>
@@ -6385,21 +6389,13 @@
           </a:fontRef>
         </p:style>
         <p:txBody>
-          <a:bodyPr lIns="0" tIns="0" rIns="0" bIns="0" rtlCol="0" anchor="ctr"/>
+          <a:bodyPr rtlCol="0" anchor="ctr"/>
           <a:lstStyle/>
           <a:p>
             <a:pPr algn="ctr"/>
-            <a:r>
-              <a:rPr lang="de-DE" sz="1100" smtClean="0">
-                <a:solidFill>
-                  <a:srgbClr val="C00000"/>
-                </a:solidFill>
-              </a:rPr>
-              <a:t>WIP</a:t>
-            </a:r>
-            <a:endParaRPr lang="en-US" sz="1100">
+            <a:endParaRPr lang="en-US">
               <a:solidFill>
-                <a:srgbClr val="C00000"/>
+                <a:schemeClr val="tx1"/>
               </a:solidFill>
             </a:endParaRPr>
           </a:p>
@@ -6407,29 +6403,28 @@
       </p:sp>
       <p:sp>
         <p:nvSpPr>
-          <p:cNvPr id="16" name="Snip Diagonal Corner Rectangle 15"/>
+          <p:cNvPr id="19" name="Chevron 18"/>
           <p:cNvSpPr/>
           <p:nvPr/>
         </p:nvSpPr>
         <p:spPr>
-          <a:xfrm rot="18900000">
-            <a:off x="4868324" y="4465706"/>
-            <a:ext cx="874782" cy="182129"/>
+          <a:xfrm>
+            <a:off x="2744663" y="668213"/>
+            <a:ext cx="180000" cy="1788269"/>
           </a:xfrm>
-          <a:prstGeom prst="snip2DiagRect">
+          <a:prstGeom prst="chevron">
             <a:avLst>
-              <a:gd name="adj1" fmla="val 0"/>
-              <a:gd name="adj2" fmla="val 39745"/>
+              <a:gd name="adj" fmla="val 85273"/>
             </a:avLst>
           </a:prstGeom>
           <a:solidFill>
-            <a:schemeClr val="bg1">
-              <a:alpha val="75000"/>
+            <a:schemeClr val="accent1">
+              <a:lumMod val="20000"/>
+              <a:lumOff val="80000"/>
             </a:schemeClr>
           </a:solidFill>
           <a:ln>
             <a:noFill/>
-            <a:prstDash val="sysDash"/>
           </a:ln>
         </p:spPr>
         <p:style>
@@ -6449,21 +6444,68 @@
           </a:fontRef>
         </p:style>
         <p:txBody>
-          <a:bodyPr lIns="0" tIns="0" rIns="0" bIns="0" rtlCol="0" anchor="ctr"/>
+          <a:bodyPr rtlCol="0" anchor="ctr"/>
           <a:lstStyle/>
           <a:p>
             <a:pPr algn="ctr"/>
-            <a:r>
-              <a:rPr lang="de-DE" sz="1100" smtClean="0">
-                <a:solidFill>
-                  <a:srgbClr val="C00000"/>
-                </a:solidFill>
-              </a:rPr>
-              <a:t>WIP</a:t>
-            </a:r>
-            <a:endParaRPr lang="en-US" sz="1100">
+            <a:endParaRPr lang="en-US">
               <a:solidFill>
-                <a:srgbClr val="C00000"/>
+                <a:schemeClr val="tx1"/>
+              </a:solidFill>
+            </a:endParaRPr>
+          </a:p>
+        </p:txBody>
+      </p:sp>
+      <p:sp>
+        <p:nvSpPr>
+          <p:cNvPr id="20" name="Chevron 19"/>
+          <p:cNvSpPr/>
+          <p:nvPr/>
+        </p:nvSpPr>
+        <p:spPr>
+          <a:xfrm>
+            <a:off x="4102590" y="668213"/>
+            <a:ext cx="180000" cy="1788269"/>
+          </a:xfrm>
+          <a:prstGeom prst="chevron">
+            <a:avLst>
+              <a:gd name="adj" fmla="val 85273"/>
+            </a:avLst>
+          </a:prstGeom>
+          <a:solidFill>
+            <a:schemeClr val="accent1">
+              <a:lumMod val="20000"/>
+              <a:lumOff val="80000"/>
+            </a:schemeClr>
+          </a:solidFill>
+          <a:ln>
+            <a:noFill/>
+          </a:ln>
+        </p:spPr>
+        <p:style>
+          <a:lnRef idx="2">
+            <a:schemeClr val="accent1">
+              <a:shade val="50000"/>
+            </a:schemeClr>
+          </a:lnRef>
+          <a:fillRef idx="1">
+            <a:schemeClr val="accent1"/>
+          </a:fillRef>
+          <a:effectRef idx="0">
+            <a:schemeClr val="accent1"/>
+          </a:effectRef>
+          <a:fontRef idx="minor">
+            <a:schemeClr val="lt1"/>
+          </a:fontRef>
+        </p:style>
+        <p:txBody>
+          <a:bodyPr rtlCol="0" anchor="ctr"/>
+          <a:lstStyle/>
+          <a:p>
+            <a:pPr algn="ctr"/>
+            <a:endParaRPr lang="en-US">
+              <a:solidFill>
+                <a:schemeClr val="tx1"/>
               </a:solidFill>
             </a:endParaRPr>
           </a:p>
@@ -6472,7 +6514,7 @@
     </p:spTree>
     <p:extLst>
       <p:ext uri="{BB962C8B-B14F-4D97-AF65-F5344CB8AC3E}">
-        <p14:creationId xmlns:p14="http://schemas.microsoft.com/office/powerpoint/2010/main" val="1265585573"/>
+        <p14:creationId xmlns:p14="http://schemas.microsoft.com/office/powerpoint/2010/main" val="1003733918"/>
       </p:ext>
     </p:extLst>
   </p:cSld>

</xml_diff>